<commit_message>
Its Las Vegas Smell Detection
</commit_message>
<xml_diff>
--- a/SlideQTests/TestFile/SlideQTestCount.pptx
+++ b/SlideQTests/TestFile/SlideQTestCount.pptx
@@ -246,7 +246,7 @@
           <a:p>
             <a:fld id="{63A1C593-65D0-4073-BCC9-577B9352EA97}" type="datetimeFigureOut">
               <a:rPr lang="en-US" smtClean="0"/>
-              <a:t>2016/09/27</a:t>
+              <a:t>2016/10/08</a:t>
             </a:fld>
             <a:endParaRPr lang="en-US"/>
           </a:p>
@@ -411,7 +411,7 @@
           <a:p>
             <a:fld id="{63A1C593-65D0-4073-BCC9-577B9352EA97}" type="datetimeFigureOut">
               <a:rPr lang="en-US" smtClean="0"/>
-              <a:t>2016/09/27</a:t>
+              <a:t>2016/10/08</a:t>
             </a:fld>
             <a:endParaRPr lang="en-US"/>
           </a:p>
@@ -586,7 +586,7 @@
           <a:p>
             <a:fld id="{63A1C593-65D0-4073-BCC9-577B9352EA97}" type="datetimeFigureOut">
               <a:rPr lang="en-US" smtClean="0"/>
-              <a:t>2016/09/27</a:t>
+              <a:t>2016/10/08</a:t>
             </a:fld>
             <a:endParaRPr lang="en-US"/>
           </a:p>
@@ -751,7 +751,7 @@
           <a:p>
             <a:fld id="{63A1C593-65D0-4073-BCC9-577B9352EA97}" type="datetimeFigureOut">
               <a:rPr lang="en-US" smtClean="0"/>
-              <a:t>2016/09/27</a:t>
+              <a:t>2016/10/08</a:t>
             </a:fld>
             <a:endParaRPr lang="en-US"/>
           </a:p>
@@ -992,7 +992,7 @@
           <a:p>
             <a:fld id="{63A1C593-65D0-4073-BCC9-577B9352EA97}" type="datetimeFigureOut">
               <a:rPr lang="en-US" smtClean="0"/>
-              <a:t>2016/09/27</a:t>
+              <a:t>2016/10/08</a:t>
             </a:fld>
             <a:endParaRPr lang="en-US"/>
           </a:p>
@@ -1219,7 +1219,7 @@
           <a:p>
             <a:fld id="{63A1C593-65D0-4073-BCC9-577B9352EA97}" type="datetimeFigureOut">
               <a:rPr lang="en-US" smtClean="0"/>
-              <a:t>2016/09/27</a:t>
+              <a:t>2016/10/08</a:t>
             </a:fld>
             <a:endParaRPr lang="en-US"/>
           </a:p>
@@ -1581,7 +1581,7 @@
           <a:p>
             <a:fld id="{63A1C593-65D0-4073-BCC9-577B9352EA97}" type="datetimeFigureOut">
               <a:rPr lang="en-US" smtClean="0"/>
-              <a:t>2016/09/27</a:t>
+              <a:t>2016/10/08</a:t>
             </a:fld>
             <a:endParaRPr lang="en-US"/>
           </a:p>
@@ -1694,7 +1694,7 @@
           <a:p>
             <a:fld id="{63A1C593-65D0-4073-BCC9-577B9352EA97}" type="datetimeFigureOut">
               <a:rPr lang="en-US" smtClean="0"/>
-              <a:t>2016/09/27</a:t>
+              <a:t>2016/10/08</a:t>
             </a:fld>
             <a:endParaRPr lang="en-US"/>
           </a:p>
@@ -1784,7 +1784,7 @@
           <a:p>
             <a:fld id="{63A1C593-65D0-4073-BCC9-577B9352EA97}" type="datetimeFigureOut">
               <a:rPr lang="en-US" smtClean="0"/>
-              <a:t>2016/09/27</a:t>
+              <a:t>2016/10/08</a:t>
             </a:fld>
             <a:endParaRPr lang="en-US"/>
           </a:p>
@@ -2056,7 +2056,7 @@
           <a:p>
             <a:fld id="{63A1C593-65D0-4073-BCC9-577B9352EA97}" type="datetimeFigureOut">
               <a:rPr lang="en-US" smtClean="0"/>
-              <a:t>2016/09/27</a:t>
+              <a:t>2016/10/08</a:t>
             </a:fld>
             <a:endParaRPr lang="en-US"/>
           </a:p>
@@ -2304,7 +2304,7 @@
           <a:p>
             <a:fld id="{63A1C593-65D0-4073-BCC9-577B9352EA97}" type="datetimeFigureOut">
               <a:rPr lang="en-US" smtClean="0"/>
-              <a:t>2016/09/27</a:t>
+              <a:t>2016/10/08</a:t>
             </a:fld>
             <a:endParaRPr lang="en-US"/>
           </a:p>
@@ -2512,7 +2512,7 @@
           <a:p>
             <a:fld id="{63A1C593-65D0-4073-BCC9-577B9352EA97}" type="datetimeFigureOut">
               <a:rPr lang="en-US" smtClean="0"/>
-              <a:t>2016/09/27</a:t>
+              <a:t>2016/10/08</a:t>
             </a:fld>
             <a:endParaRPr lang="en-US"/>
           </a:p>
@@ -2999,11 +2999,315 @@
           </a:p>
         </p:txBody>
       </p:sp>
+      <p:sp>
+        <p:nvSpPr>
+          <p:cNvPr id="2" name="Oval 1"/>
+          <p:cNvSpPr/>
+          <p:nvPr/>
+        </p:nvSpPr>
+        <p:spPr>
+          <a:xfrm>
+            <a:off x="4906851" y="2202287"/>
+            <a:ext cx="4456090" cy="1957589"/>
+          </a:xfrm>
+          <a:prstGeom prst="ellipse">
+            <a:avLst/>
+          </a:prstGeom>
+        </p:spPr>
+        <p:style>
+          <a:lnRef idx="2">
+            <a:schemeClr val="accent1">
+              <a:shade val="50000"/>
+            </a:schemeClr>
+          </a:lnRef>
+          <a:fillRef idx="1">
+            <a:schemeClr val="accent1"/>
+          </a:fillRef>
+          <a:effectRef idx="0">
+            <a:schemeClr val="accent1"/>
+          </a:effectRef>
+          <a:fontRef idx="minor">
+            <a:schemeClr val="lt1"/>
+          </a:fontRef>
+        </p:style>
+        <p:txBody>
+          <a:bodyPr rtlCol="0" anchor="ctr"/>
+          <a:lstStyle/>
+          <a:p>
+            <a:pPr algn="ctr"/>
+            <a:endParaRPr lang="en-US"/>
+          </a:p>
+        </p:txBody>
+      </p:sp>
+      <p:sp>
+        <p:nvSpPr>
+          <p:cNvPr id="3" name="Snip Single Corner Rectangle 2"/>
+          <p:cNvSpPr/>
+          <p:nvPr/>
+        </p:nvSpPr>
+        <p:spPr>
+          <a:xfrm>
+            <a:off x="1429555" y="2665927"/>
+            <a:ext cx="2511380" cy="3155324"/>
+          </a:xfrm>
+          <a:prstGeom prst="snip1Rect">
+            <a:avLst/>
+          </a:prstGeom>
+        </p:spPr>
+        <p:style>
+          <a:lnRef idx="2">
+            <a:schemeClr val="accent1">
+              <a:shade val="50000"/>
+            </a:schemeClr>
+          </a:lnRef>
+          <a:fillRef idx="1">
+            <a:schemeClr val="accent1"/>
+          </a:fillRef>
+          <a:effectRef idx="0">
+            <a:schemeClr val="accent1"/>
+          </a:effectRef>
+          <a:fontRef idx="minor">
+            <a:schemeClr val="lt1"/>
+          </a:fontRef>
+        </p:style>
+        <p:txBody>
+          <a:bodyPr rtlCol="0" anchor="ctr"/>
+          <a:lstStyle/>
+          <a:p>
+            <a:pPr algn="ctr"/>
+            <a:endParaRPr lang="en-US"/>
+          </a:p>
+        </p:txBody>
+      </p:sp>
     </p:spTree>
   </p:cSld>
   <p:clrMapOvr>
     <a:masterClrMapping/>
   </p:clrMapOvr>
+  <p:timing>
+    <p:tnLst>
+      <p:par>
+        <p:cTn id="1" dur="indefinite" restart="never" nodeType="tmRoot">
+          <p:childTnLst>
+            <p:seq concurrent="1" nextAc="seek">
+              <p:cTn id="2" dur="indefinite" nodeType="mainSeq">
+                <p:childTnLst>
+                  <p:par>
+                    <p:cTn id="3" fill="hold">
+                      <p:stCondLst>
+                        <p:cond delay="indefinite"/>
+                      </p:stCondLst>
+                      <p:childTnLst>
+                        <p:par>
+                          <p:cTn id="4" fill="hold">
+                            <p:stCondLst>
+                              <p:cond delay="0"/>
+                            </p:stCondLst>
+                            <p:childTnLst>
+                              <p:par>
+                                <p:cTn id="5" presetID="1" presetClass="entr" presetSubtype="0" fill="hold" grpId="0" nodeType="clickEffect">
+                                  <p:stCondLst>
+                                    <p:cond delay="0"/>
+                                  </p:stCondLst>
+                                  <p:childTnLst>
+                                    <p:set>
+                                      <p:cBhvr>
+                                        <p:cTn id="6" dur="1" fill="hold">
+                                          <p:stCondLst>
+                                            <p:cond delay="0"/>
+                                          </p:stCondLst>
+                                        </p:cTn>
+                                        <p:tgtEl>
+                                          <p:spTgt spid="4"/>
+                                        </p:tgtEl>
+                                        <p:attrNameLst>
+                                          <p:attrName>style.visibility</p:attrName>
+                                        </p:attrNameLst>
+                                      </p:cBhvr>
+                                      <p:to>
+                                        <p:strVal val="visible"/>
+                                      </p:to>
+                                    </p:set>
+                                  </p:childTnLst>
+                                </p:cTn>
+                              </p:par>
+                            </p:childTnLst>
+                          </p:cTn>
+                        </p:par>
+                      </p:childTnLst>
+                    </p:cTn>
+                  </p:par>
+                  <p:par>
+                    <p:cTn id="7" fill="hold">
+                      <p:stCondLst>
+                        <p:cond delay="indefinite"/>
+                      </p:stCondLst>
+                      <p:childTnLst>
+                        <p:par>
+                          <p:cTn id="8" fill="hold">
+                            <p:stCondLst>
+                              <p:cond delay="0"/>
+                            </p:stCondLst>
+                            <p:childTnLst>
+                              <p:par>
+                                <p:cTn id="9" presetID="2" presetClass="entr" presetSubtype="4" fill="hold" grpId="0" nodeType="clickEffect">
+                                  <p:stCondLst>
+                                    <p:cond delay="0"/>
+                                  </p:stCondLst>
+                                  <p:childTnLst>
+                                    <p:set>
+                                      <p:cBhvr>
+                                        <p:cTn id="10" dur="1" fill="hold">
+                                          <p:stCondLst>
+                                            <p:cond delay="0"/>
+                                          </p:stCondLst>
+                                        </p:cTn>
+                                        <p:tgtEl>
+                                          <p:spTgt spid="2"/>
+                                        </p:tgtEl>
+                                        <p:attrNameLst>
+                                          <p:attrName>style.visibility</p:attrName>
+                                        </p:attrNameLst>
+                                      </p:cBhvr>
+                                      <p:to>
+                                        <p:strVal val="visible"/>
+                                      </p:to>
+                                    </p:set>
+                                    <p:anim calcmode="lin" valueType="num">
+                                      <p:cBhvr additive="base">
+                                        <p:cTn id="11" dur="500" fill="hold"/>
+                                        <p:tgtEl>
+                                          <p:spTgt spid="2"/>
+                                        </p:tgtEl>
+                                        <p:attrNameLst>
+                                          <p:attrName>ppt_x</p:attrName>
+                                        </p:attrNameLst>
+                                      </p:cBhvr>
+                                      <p:tavLst>
+                                        <p:tav tm="0">
+                                          <p:val>
+                                            <p:strVal val="#ppt_x"/>
+                                          </p:val>
+                                        </p:tav>
+                                        <p:tav tm="100000">
+                                          <p:val>
+                                            <p:strVal val="#ppt_x"/>
+                                          </p:val>
+                                        </p:tav>
+                                      </p:tavLst>
+                                    </p:anim>
+                                    <p:anim calcmode="lin" valueType="num">
+                                      <p:cBhvr additive="base">
+                                        <p:cTn id="12" dur="500" fill="hold"/>
+                                        <p:tgtEl>
+                                          <p:spTgt spid="2"/>
+                                        </p:tgtEl>
+                                        <p:attrNameLst>
+                                          <p:attrName>ppt_y</p:attrName>
+                                        </p:attrNameLst>
+                                      </p:cBhvr>
+                                      <p:tavLst>
+                                        <p:tav tm="0">
+                                          <p:val>
+                                            <p:strVal val="1+#ppt_h/2"/>
+                                          </p:val>
+                                        </p:tav>
+                                        <p:tav tm="100000">
+                                          <p:val>
+                                            <p:strVal val="#ppt_y"/>
+                                          </p:val>
+                                        </p:tav>
+                                      </p:tavLst>
+                                    </p:anim>
+                                  </p:childTnLst>
+                                </p:cTn>
+                              </p:par>
+                            </p:childTnLst>
+                          </p:cTn>
+                        </p:par>
+                      </p:childTnLst>
+                    </p:cTn>
+                  </p:par>
+                  <p:par>
+                    <p:cTn id="13" fill="hold">
+                      <p:stCondLst>
+                        <p:cond delay="indefinite"/>
+                      </p:stCondLst>
+                      <p:childTnLst>
+                        <p:par>
+                          <p:cTn id="14" fill="hold">
+                            <p:stCondLst>
+                              <p:cond delay="0"/>
+                            </p:stCondLst>
+                            <p:childTnLst>
+                              <p:par>
+                                <p:cTn id="15" presetID="22" presetClass="entr" presetSubtype="4" fill="hold" grpId="0" nodeType="clickEffect">
+                                  <p:stCondLst>
+                                    <p:cond delay="0"/>
+                                  </p:stCondLst>
+                                  <p:childTnLst>
+                                    <p:set>
+                                      <p:cBhvr>
+                                        <p:cTn id="16" dur="1" fill="hold">
+                                          <p:stCondLst>
+                                            <p:cond delay="0"/>
+                                          </p:stCondLst>
+                                        </p:cTn>
+                                        <p:tgtEl>
+                                          <p:spTgt spid="3"/>
+                                        </p:tgtEl>
+                                        <p:attrNameLst>
+                                          <p:attrName>style.visibility</p:attrName>
+                                        </p:attrNameLst>
+                                      </p:cBhvr>
+                                      <p:to>
+                                        <p:strVal val="visible"/>
+                                      </p:to>
+                                    </p:set>
+                                    <p:animEffect transition="in" filter="wipe(down)">
+                                      <p:cBhvr>
+                                        <p:cTn id="17" dur="500"/>
+                                        <p:tgtEl>
+                                          <p:spTgt spid="3"/>
+                                        </p:tgtEl>
+                                      </p:cBhvr>
+                                    </p:animEffect>
+                                  </p:childTnLst>
+                                </p:cTn>
+                              </p:par>
+                            </p:childTnLst>
+                          </p:cTn>
+                        </p:par>
+                      </p:childTnLst>
+                    </p:cTn>
+                  </p:par>
+                </p:childTnLst>
+              </p:cTn>
+              <p:prevCondLst>
+                <p:cond evt="onPrev" delay="0">
+                  <p:tgtEl>
+                    <p:sldTgt/>
+                  </p:tgtEl>
+                </p:cond>
+              </p:prevCondLst>
+              <p:nextCondLst>
+                <p:cond evt="onNext" delay="0">
+                  <p:tgtEl>
+                    <p:sldTgt/>
+                  </p:tgtEl>
+                </p:cond>
+              </p:nextCondLst>
+            </p:seq>
+          </p:childTnLst>
+        </p:cTn>
+      </p:par>
+    </p:tnLst>
+    <p:bldLst>
+      <p:bldP spid="4" grpId="0" animBg="1"/>
+      <p:bldP spid="2" grpId="0" animBg="1"/>
+      <p:bldP spid="3" grpId="0" animBg="1"/>
+    </p:bldLst>
+  </p:timing>
 </p:sld>
 </file>
 

</xml_diff>

<commit_message>
3 smell detector addedd
</commit_message>
<xml_diff>
--- a/SlideQTests/TestFile/SlideQTestCount.pptx
+++ b/SlideQTests/TestFile/SlideQTestCount.pptx
@@ -9,6 +9,8 @@
     <p:sldId id="257" r:id="rId3"/>
     <p:sldId id="258" r:id="rId4"/>
     <p:sldId id="259" r:id="rId5"/>
+    <p:sldId id="260" r:id="rId6"/>
+    <p:sldId id="261" r:id="rId7"/>
   </p:sldIdLst>
   <p:sldSz cx="12192000" cy="6858000"/>
   <p:notesSz cx="6858000" cy="9144000"/>
@@ -246,7 +248,7 @@
           <a:p>
             <a:fld id="{63A1C593-65D0-4073-BCC9-577B9352EA97}" type="datetimeFigureOut">
               <a:rPr lang="en-US" smtClean="0"/>
-              <a:t>2016/10/11</a:t>
+              <a:t>2016/10/19</a:t>
             </a:fld>
             <a:endParaRPr lang="en-US"/>
           </a:p>
@@ -411,7 +413,7 @@
           <a:p>
             <a:fld id="{63A1C593-65D0-4073-BCC9-577B9352EA97}" type="datetimeFigureOut">
               <a:rPr lang="en-US" smtClean="0"/>
-              <a:t>2016/10/11</a:t>
+              <a:t>2016/10/19</a:t>
             </a:fld>
             <a:endParaRPr lang="en-US"/>
           </a:p>
@@ -586,7 +588,7 @@
           <a:p>
             <a:fld id="{63A1C593-65D0-4073-BCC9-577B9352EA97}" type="datetimeFigureOut">
               <a:rPr lang="en-US" smtClean="0"/>
-              <a:t>2016/10/11</a:t>
+              <a:t>2016/10/19</a:t>
             </a:fld>
             <a:endParaRPr lang="en-US"/>
           </a:p>
@@ -751,7 +753,7 @@
           <a:p>
             <a:fld id="{63A1C593-65D0-4073-BCC9-577B9352EA97}" type="datetimeFigureOut">
               <a:rPr lang="en-US" smtClean="0"/>
-              <a:t>2016/10/11</a:t>
+              <a:t>2016/10/19</a:t>
             </a:fld>
             <a:endParaRPr lang="en-US"/>
           </a:p>
@@ -992,7 +994,7 @@
           <a:p>
             <a:fld id="{63A1C593-65D0-4073-BCC9-577B9352EA97}" type="datetimeFigureOut">
               <a:rPr lang="en-US" smtClean="0"/>
-              <a:t>2016/10/11</a:t>
+              <a:t>2016/10/19</a:t>
             </a:fld>
             <a:endParaRPr lang="en-US"/>
           </a:p>
@@ -1219,7 +1221,7 @@
           <a:p>
             <a:fld id="{63A1C593-65D0-4073-BCC9-577B9352EA97}" type="datetimeFigureOut">
               <a:rPr lang="en-US" smtClean="0"/>
-              <a:t>2016/10/11</a:t>
+              <a:t>2016/10/19</a:t>
             </a:fld>
             <a:endParaRPr lang="en-US"/>
           </a:p>
@@ -1581,7 +1583,7 @@
           <a:p>
             <a:fld id="{63A1C593-65D0-4073-BCC9-577B9352EA97}" type="datetimeFigureOut">
               <a:rPr lang="en-US" smtClean="0"/>
-              <a:t>2016/10/11</a:t>
+              <a:t>2016/10/19</a:t>
             </a:fld>
             <a:endParaRPr lang="en-US"/>
           </a:p>
@@ -1694,7 +1696,7 @@
           <a:p>
             <a:fld id="{63A1C593-65D0-4073-BCC9-577B9352EA97}" type="datetimeFigureOut">
               <a:rPr lang="en-US" smtClean="0"/>
-              <a:t>2016/10/11</a:t>
+              <a:t>2016/10/19</a:t>
             </a:fld>
             <a:endParaRPr lang="en-US"/>
           </a:p>
@@ -1784,7 +1786,7 @@
           <a:p>
             <a:fld id="{63A1C593-65D0-4073-BCC9-577B9352EA97}" type="datetimeFigureOut">
               <a:rPr lang="en-US" smtClean="0"/>
-              <a:t>2016/10/11</a:t>
+              <a:t>2016/10/19</a:t>
             </a:fld>
             <a:endParaRPr lang="en-US"/>
           </a:p>
@@ -2056,7 +2058,7 @@
           <a:p>
             <a:fld id="{63A1C593-65D0-4073-BCC9-577B9352EA97}" type="datetimeFigureOut">
               <a:rPr lang="en-US" smtClean="0"/>
-              <a:t>2016/10/11</a:t>
+              <a:t>2016/10/19</a:t>
             </a:fld>
             <a:endParaRPr lang="en-US"/>
           </a:p>
@@ -2304,7 +2306,7 @@
           <a:p>
             <a:fld id="{63A1C593-65D0-4073-BCC9-577B9352EA97}" type="datetimeFigureOut">
               <a:rPr lang="en-US" smtClean="0"/>
-              <a:t>2016/10/11</a:t>
+              <a:t>2016/10/19</a:t>
             </a:fld>
             <a:endParaRPr lang="en-US"/>
           </a:p>
@@ -2512,7 +2514,7 @@
           <a:p>
             <a:fld id="{63A1C593-65D0-4073-BCC9-577B9352EA97}" type="datetimeFigureOut">
               <a:rPr lang="en-US" smtClean="0"/>
-              <a:t>2016/10/11</a:t>
+              <a:t>2016/10/19</a:t>
             </a:fld>
             <a:endParaRPr lang="en-US"/>
           </a:p>
@@ -2939,6 +2941,13 @@
   <p:clrMapOvr>
     <a:masterClrMapping/>
   </p:clrMapOvr>
+  <p:timing>
+    <p:tnLst>
+      <p:par>
+        <p:cTn id="1" dur="indefinite" restart="never" nodeType="tmRoot"/>
+      </p:par>
+    </p:tnLst>
+  </p:timing>
 </p:sld>
 </file>
 
@@ -3394,6 +3403,13 @@
   <p:clrMapOvr>
     <a:masterClrMapping/>
   </p:clrMapOvr>
+  <p:timing>
+    <p:tnLst>
+      <p:par>
+        <p:cTn id="1" dur="indefinite" restart="never" nodeType="tmRoot"/>
+      </p:par>
+    </p:tnLst>
+  </p:timing>
 </p:sld>
 </file>
 
@@ -3459,7 +3475,17 @@
             </a:r>
             <a:r>
               <a:rPr lang="en-US" sz="1400" dirty="0" smtClean="0"/>
-              <a:t> can you </a:t>
+              <a:t> can </a:t>
+            </a:r>
+            <a:r>
+              <a:rPr lang="en-US" sz="1400" dirty="0" smtClean="0">
+                <a:latin typeface="Algerian" panose="04020705040A02060702" pitchFamily="82" charset="0"/>
+              </a:rPr>
+              <a:t>you</a:t>
+            </a:r>
+            <a:r>
+              <a:rPr lang="en-US" sz="1400" dirty="0" smtClean="0"/>
+              <a:t> </a:t>
             </a:r>
             <a:r>
               <a:rPr lang="en-US" sz="1400" dirty="0" smtClean="0">
@@ -3498,6 +3524,190 @@
     <p:extLst>
       <p:ext uri="{BB962C8B-B14F-4D97-AF65-F5344CB8AC3E}">
         <p14:creationId xmlns:p14="http://schemas.microsoft.com/office/powerpoint/2010/main" val="858684902"/>
+      </p:ext>
+    </p:extLst>
+  </p:cSld>
+  <p:clrMapOvr>
+    <a:masterClrMapping/>
+  </p:clrMapOvr>
+  <p:timing>
+    <p:tnLst>
+      <p:par>
+        <p:cTn id="1" dur="indefinite" restart="never" nodeType="tmRoot"/>
+      </p:par>
+    </p:tnLst>
+  </p:timing>
+</p:sld>
+</file>
+
+<file path=ppt/slides/slide5.xml><?xml version="1.0" encoding="utf-8"?>
+<p:sld xmlns:a="http://schemas.openxmlformats.org/drawingml/2006/main" xmlns:r="http://schemas.openxmlformats.org/officeDocument/2006/relationships" xmlns:p="http://schemas.openxmlformats.org/presentationml/2006/main">
+  <p:cSld>
+    <p:spTree>
+      <p:nvGrpSpPr>
+        <p:cNvPr id="1" name=""/>
+        <p:cNvGrpSpPr/>
+        <p:nvPr/>
+      </p:nvGrpSpPr>
+      <p:grpSpPr>
+        <a:xfrm>
+          <a:off x="0" y="0"/>
+          <a:ext cx="0" cy="0"/>
+          <a:chOff x="0" y="0"/>
+          <a:chExt cx="0" cy="0"/>
+        </a:xfrm>
+      </p:grpSpPr>
+      <p:sp>
+        <p:nvSpPr>
+          <p:cNvPr id="2" name="Title 1"/>
+          <p:cNvSpPr>
+            <a:spLocks noGrp="1"/>
+          </p:cNvSpPr>
+          <p:nvPr>
+            <p:ph type="title"/>
+          </p:nvPr>
+        </p:nvSpPr>
+        <p:spPr/>
+        <p:txBody>
+          <a:bodyPr/>
+          <a:lstStyle/>
+          <a:p>
+            <a:endParaRPr lang="en-US"/>
+          </a:p>
+        </p:txBody>
+      </p:sp>
+      <p:sp>
+        <p:nvSpPr>
+          <p:cNvPr id="3" name="Content Placeholder 2"/>
+          <p:cNvSpPr>
+            <a:spLocks noGrp="1"/>
+          </p:cNvSpPr>
+          <p:nvPr>
+            <p:ph idx="1"/>
+          </p:nvPr>
+        </p:nvSpPr>
+        <p:spPr/>
+        <p:txBody>
+          <a:bodyPr/>
+          <a:lstStyle/>
+          <a:p>
+            <a:r>
+              <a:rPr lang="en-US" dirty="0" smtClean="0"/>
+              <a:t>Hello </a:t>
+            </a:r>
+          </a:p>
+          <a:p>
+            <a:pPr lvl="1"/>
+            <a:r>
+              <a:rPr lang="en-US" dirty="0" smtClean="0"/>
+              <a:t>Hi</a:t>
+            </a:r>
+          </a:p>
+          <a:p>
+            <a:pPr lvl="2"/>
+            <a:r>
+              <a:rPr lang="en-US" dirty="0" smtClean="0"/>
+              <a:t>3</a:t>
+            </a:r>
+            <a:r>
+              <a:rPr lang="en-US" baseline="30000" dirty="0" smtClean="0"/>
+              <a:t>rd</a:t>
+            </a:r>
+            <a:r>
+              <a:rPr lang="en-US" dirty="0" smtClean="0"/>
+              <a:t> level</a:t>
+            </a:r>
+            <a:endParaRPr lang="en-US" dirty="0"/>
+          </a:p>
+        </p:txBody>
+      </p:sp>
+    </p:spTree>
+    <p:extLst>
+      <p:ext uri="{BB962C8B-B14F-4D97-AF65-F5344CB8AC3E}">
+        <p14:creationId xmlns:p14="http://schemas.microsoft.com/office/powerpoint/2010/main" val="3409401435"/>
+      </p:ext>
+    </p:extLst>
+  </p:cSld>
+  <p:clrMapOvr>
+    <a:masterClrMapping/>
+  </p:clrMapOvr>
+  <p:timing>
+    <p:tnLst>
+      <p:par>
+        <p:cTn id="1" dur="indefinite" restart="never" nodeType="tmRoot"/>
+      </p:par>
+    </p:tnLst>
+  </p:timing>
+</p:sld>
+</file>
+
+<file path=ppt/slides/slide6.xml><?xml version="1.0" encoding="utf-8"?>
+<p:sld xmlns:a="http://schemas.openxmlformats.org/drawingml/2006/main" xmlns:r="http://schemas.openxmlformats.org/officeDocument/2006/relationships" xmlns:p="http://schemas.openxmlformats.org/presentationml/2006/main">
+  <p:cSld>
+    <p:spTree>
+      <p:nvGrpSpPr>
+        <p:cNvPr id="1" name=""/>
+        <p:cNvGrpSpPr/>
+        <p:nvPr/>
+      </p:nvGrpSpPr>
+      <p:grpSpPr>
+        <a:xfrm>
+          <a:off x="0" y="0"/>
+          <a:ext cx="0" cy="0"/>
+          <a:chOff x="0" y="0"/>
+          <a:chExt cx="0" cy="0"/>
+        </a:xfrm>
+      </p:grpSpPr>
+      <p:sp>
+        <p:nvSpPr>
+          <p:cNvPr id="2" name="Title 1"/>
+          <p:cNvSpPr>
+            <a:spLocks noGrp="1"/>
+          </p:cNvSpPr>
+          <p:nvPr>
+            <p:ph type="title"/>
+          </p:nvPr>
+        </p:nvSpPr>
+        <p:spPr/>
+        <p:txBody>
+          <a:bodyPr/>
+          <a:lstStyle/>
+          <a:p>
+            <a:endParaRPr lang="en-US" dirty="0"/>
+          </a:p>
+        </p:txBody>
+      </p:sp>
+      <p:sp>
+        <p:nvSpPr>
+          <p:cNvPr id="3" name="Content Placeholder 2"/>
+          <p:cNvSpPr>
+            <a:spLocks noGrp="1"/>
+          </p:cNvSpPr>
+          <p:nvPr>
+            <p:ph idx="1"/>
+          </p:nvPr>
+        </p:nvSpPr>
+        <p:spPr/>
+        <p:txBody>
+          <a:bodyPr/>
+          <a:lstStyle/>
+          <a:p>
+            <a:r>
+              <a:rPr lang="en-US" dirty="0" err="1" smtClean="0"/>
+              <a:t>Renama</a:t>
+            </a:r>
+            <a:r>
+              <a:rPr lang="en-US" smtClean="0"/>
+              <a:t> </a:t>
+            </a:r>
+            <a:endParaRPr lang="en-US"/>
+          </a:p>
+        </p:txBody>
+      </p:sp>
+    </p:spTree>
+    <p:extLst>
+      <p:ext uri="{BB962C8B-B14F-4D97-AF65-F5344CB8AC3E}">
+        <p14:creationId xmlns:p14="http://schemas.microsoft.com/office/powerpoint/2010/main" val="1563517128"/>
       </p:ext>
     </p:extLst>
   </p:cSld>

</xml_diff>